<commit_message>
does it matter now?
</commit_message>
<xml_diff>
--- a/Presentations/Presentation 6/Presentation 6.pptx
+++ b/Presentations/Presentation 6/Presentation 6.pptx
@@ -304,7 +304,7 @@
           <a:p>
             <a:fld id="{2DD8E0ED-CF62-4469-AB6B-F138C036E1BD}" type="datetimeFigureOut">
               <a:rPr lang="en-GB" smtClean="0"/>
-              <a:t>20/04/2018</a:t>
+              <a:t>25/04/2018</a:t>
             </a:fld>
             <a:endParaRPr lang="en-GB"/>
           </a:p>
@@ -474,7 +474,7 @@
           <a:p>
             <a:fld id="{2DD8E0ED-CF62-4469-AB6B-F138C036E1BD}" type="datetimeFigureOut">
               <a:rPr lang="en-GB" smtClean="0"/>
-              <a:t>20/04/2018</a:t>
+              <a:t>25/04/2018</a:t>
             </a:fld>
             <a:endParaRPr lang="en-GB"/>
           </a:p>
@@ -697,7 +697,7 @@
           <a:p>
             <a:fld id="{2DD8E0ED-CF62-4469-AB6B-F138C036E1BD}" type="datetimeFigureOut">
               <a:rPr lang="en-GB" smtClean="0"/>
-              <a:t>20/04/2018</a:t>
+              <a:t>25/04/2018</a:t>
             </a:fld>
             <a:endParaRPr lang="en-GB"/>
           </a:p>
@@ -877,7 +877,7 @@
           <a:p>
             <a:fld id="{2DD8E0ED-CF62-4469-AB6B-F138C036E1BD}" type="datetimeFigureOut">
               <a:rPr lang="en-GB" smtClean="0"/>
-              <a:t>20/04/2018</a:t>
+              <a:t>25/04/2018</a:t>
             </a:fld>
             <a:endParaRPr lang="en-GB"/>
           </a:p>
@@ -1183,7 +1183,7 @@
           <a:p>
             <a:fld id="{2DD8E0ED-CF62-4469-AB6B-F138C036E1BD}" type="datetimeFigureOut">
               <a:rPr lang="en-GB" smtClean="0"/>
-              <a:t>20/04/2018</a:t>
+              <a:t>25/04/2018</a:t>
             </a:fld>
             <a:endParaRPr lang="en-GB"/>
           </a:p>
@@ -1487,7 +1487,7 @@
           <a:p>
             <a:fld id="{2DD8E0ED-CF62-4469-AB6B-F138C036E1BD}" type="datetimeFigureOut">
               <a:rPr lang="en-GB" smtClean="0"/>
-              <a:t>20/04/2018</a:t>
+              <a:t>25/04/2018</a:t>
             </a:fld>
             <a:endParaRPr lang="en-GB"/>
           </a:p>
@@ -1909,7 +1909,7 @@
           <a:p>
             <a:fld id="{2DD8E0ED-CF62-4469-AB6B-F138C036E1BD}" type="datetimeFigureOut">
               <a:rPr lang="en-GB" smtClean="0"/>
-              <a:t>20/04/2018</a:t>
+              <a:t>25/04/2018</a:t>
             </a:fld>
             <a:endParaRPr lang="en-GB"/>
           </a:p>
@@ -2027,7 +2027,7 @@
           <a:p>
             <a:fld id="{2DD8E0ED-CF62-4469-AB6B-F138C036E1BD}" type="datetimeFigureOut">
               <a:rPr lang="en-GB" smtClean="0"/>
-              <a:t>20/04/2018</a:t>
+              <a:t>25/04/2018</a:t>
             </a:fld>
             <a:endParaRPr lang="en-GB"/>
           </a:p>
@@ -2122,7 +2122,7 @@
           <a:p>
             <a:fld id="{2DD8E0ED-CF62-4469-AB6B-F138C036E1BD}" type="datetimeFigureOut">
               <a:rPr lang="en-GB" smtClean="0"/>
-              <a:t>20/04/2018</a:t>
+              <a:t>25/04/2018</a:t>
             </a:fld>
             <a:endParaRPr lang="en-GB"/>
           </a:p>
@@ -2395,7 +2395,7 @@
           <a:p>
             <a:fld id="{2DD8E0ED-CF62-4469-AB6B-F138C036E1BD}" type="datetimeFigureOut">
               <a:rPr lang="en-GB" smtClean="0"/>
-              <a:t>20/04/2018</a:t>
+              <a:t>25/04/2018</a:t>
             </a:fld>
             <a:endParaRPr lang="en-GB"/>
           </a:p>
@@ -2660,7 +2660,7 @@
           <a:p>
             <a:fld id="{2DD8E0ED-CF62-4469-AB6B-F138C036E1BD}" type="datetimeFigureOut">
               <a:rPr lang="en-GB" smtClean="0"/>
-              <a:t>20/04/2018</a:t>
+              <a:t>25/04/2018</a:t>
             </a:fld>
             <a:endParaRPr lang="en-GB"/>
           </a:p>
@@ -2909,7 +2909,7 @@
           <a:p>
             <a:fld id="{2DD8E0ED-CF62-4469-AB6B-F138C036E1BD}" type="datetimeFigureOut">
               <a:rPr lang="en-GB" smtClean="0"/>
-              <a:t>20/04/2018</a:t>
+              <a:t>25/04/2018</a:t>
             </a:fld>
             <a:endParaRPr lang="en-GB"/>
           </a:p>
@@ -3842,7 +3842,7 @@
         </p:blipFill>
         <p:spPr>
           <a:xfrm>
-            <a:off x="378804" y="4699000"/>
+            <a:off x="404204" y="4699000"/>
             <a:ext cx="5654627" cy="1882820"/>
           </a:xfrm>
           <a:prstGeom prst="rect">

</xml_diff>